<commit_message>
Update for Read and Write
</commit_message>
<xml_diff>
--- a/Dynamo_Understanding.pptx
+++ b/Dynamo_Understanding.pptx
@@ -6,7 +6,12 @@
   </p:sldMasterIdLst>
   <p:sldIdLst>
     <p:sldId id="256" r:id="rId2"/>
-    <p:sldId id="257" r:id="rId3"/>
+    <p:sldId id="258" r:id="rId3"/>
+    <p:sldId id="259" r:id="rId4"/>
+    <p:sldId id="260" r:id="rId5"/>
+    <p:sldId id="261" r:id="rId6"/>
+    <p:sldId id="262" r:id="rId7"/>
+    <p:sldId id="263" r:id="rId8"/>
   </p:sldIdLst>
   <p:sldSz cx="12192000" cy="6858000"/>
   <p:notesSz cx="6858000" cy="9144000"/>
@@ -105,6 +110,11 @@
       </a:defRPr>
     </a:lvl9pPr>
   </p:defaultTextStyle>
+  <p:extLst>
+    <p:ext uri="{EFAFB233-063F-42B5-8137-9DF3F51BA10A}">
+      <p15:sldGuideLst xmlns:p15="http://schemas.microsoft.com/office/powerpoint/2012/main"/>
+    </p:ext>
+  </p:extLst>
 </p:presentation>
 </file>
 
@@ -3522,10 +3532,1327 @@
           <a:chExt cx="0" cy="0"/>
         </a:xfrm>
       </p:grpSpPr>
+      <p:sp>
+        <p:nvSpPr>
+          <p:cNvPr id="4" name="TextBox 3">
+            <a:extLst>
+              <a:ext uri="{FF2B5EF4-FFF2-40B4-BE49-F238E27FC236}">
+                <a16:creationId xmlns:a16="http://schemas.microsoft.com/office/drawing/2014/main" id="{1D7BFE94-5FA8-4725-902E-9F12B1848A72}"/>
+              </a:ext>
+            </a:extLst>
+          </p:cNvPr>
+          <p:cNvSpPr txBox="1"/>
+          <p:nvPr/>
+        </p:nvSpPr>
+        <p:spPr>
+          <a:xfrm>
+            <a:off x="1148316" y="768485"/>
+            <a:ext cx="10302949" cy="5355312"/>
+          </a:xfrm>
+          <a:prstGeom prst="rect">
+            <a:avLst/>
+          </a:prstGeom>
+          <a:noFill/>
+        </p:spPr>
+        <p:txBody>
+          <a:bodyPr wrap="square" rtlCol="0">
+            <a:spAutoFit/>
+          </a:bodyPr>
+          <a:lstStyle/>
+          <a:p>
+            <a:r>
+              <a:rPr lang="en-US" dirty="0"/>
+              <a:t>Dynamo</a:t>
+            </a:r>
+          </a:p>
+          <a:p>
+            <a:r>
+              <a:rPr lang="en-US" b="1" dirty="0">
+                <a:solidFill>
+                  <a:srgbClr val="0070C0"/>
+                </a:solidFill>
+              </a:rPr>
+              <a:t>Dynamo (and Apache Cassandra) often uses a simple conflict resolution policy: last-write-wins (LWW), based on the wall-clock timestamp.</a:t>
+            </a:r>
+          </a:p>
+          <a:p>
+            <a:endParaRPr lang="en-US" dirty="0"/>
+          </a:p>
+          <a:p>
+            <a:endParaRPr lang="en-US" dirty="0"/>
+          </a:p>
+          <a:p>
+            <a:r>
+              <a:rPr lang="en-US" dirty="0"/>
+              <a:t>Three Different approach for resolving the conflicts in systems</a:t>
+            </a:r>
+          </a:p>
+          <a:p>
+            <a:pPr marL="285750" indent="-285750">
+              <a:buFontTx/>
+              <a:buChar char="-"/>
+            </a:pPr>
+            <a:r>
+              <a:rPr lang="en-US" dirty="0"/>
+              <a:t>Approach 01 : Resolving conflicts using vector clock assigned with each write.</a:t>
+            </a:r>
+          </a:p>
+          <a:p>
+            <a:r>
+              <a:rPr lang="en-US" dirty="0"/>
+              <a:t>     This is same as git is doing</a:t>
+            </a:r>
+          </a:p>
+          <a:p>
+            <a:endParaRPr lang="en-US" b="1" i="0" dirty="0">
+              <a:solidFill>
+                <a:srgbClr val="3D3D4E"/>
+              </a:solidFill>
+              <a:effectLst/>
+              <a:latin typeface="Droid Serif"/>
+            </a:endParaRPr>
+          </a:p>
+          <a:p>
+            <a:r>
+              <a:rPr lang="en-US" b="1" dirty="0">
+                <a:solidFill>
+                  <a:srgbClr val="0070C0"/>
+                </a:solidFill>
+              </a:rPr>
+              <a:t>Resolving conflicts is like how Git works. If Git can merge different versions into one, merging is done automatically. If not, the client (i.e., the developer) must reconcile conflicts manually.</a:t>
+            </a:r>
+          </a:p>
+          <a:p>
+            <a:endParaRPr lang="en-US" b="1" dirty="0">
+              <a:solidFill>
+                <a:srgbClr val="0070C0"/>
+              </a:solidFill>
+            </a:endParaRPr>
+          </a:p>
+          <a:p>
+            <a:pPr marL="285750" indent="-285750">
+              <a:buFontTx/>
+              <a:buChar char="-"/>
+            </a:pPr>
+            <a:r>
+              <a:rPr lang="en-US" dirty="0"/>
+              <a:t>Approach 02 : Conflict-free replicated data types (CRDTs)</a:t>
+            </a:r>
+          </a:p>
+          <a:p>
+            <a:pPr marL="285750" indent="-285750">
+              <a:buFontTx/>
+              <a:buChar char="-"/>
+            </a:pPr>
+            <a:endParaRPr lang="en-US" b="1" dirty="0">
+              <a:latin typeface="Nunito Sans" pitchFamily="2" charset="0"/>
+            </a:endParaRPr>
+          </a:p>
+          <a:p>
+            <a:pPr marL="285750" indent="-285750">
+              <a:buFontTx/>
+              <a:buChar char="-"/>
+            </a:pPr>
+            <a:endParaRPr lang="en-US" b="1" dirty="0">
+              <a:latin typeface="Nunito Sans" pitchFamily="2" charset="0"/>
+            </a:endParaRPr>
+          </a:p>
+          <a:p>
+            <a:pPr marL="285750" indent="-285750">
+              <a:buFontTx/>
+              <a:buChar char="-"/>
+            </a:pPr>
+            <a:r>
+              <a:rPr lang="en-US" dirty="0"/>
+              <a:t>Approach 03 : </a:t>
+            </a:r>
+            <a:r>
+              <a:rPr lang="en-IN" dirty="0"/>
+              <a:t>Last-write-wins (LWW)</a:t>
+            </a:r>
+            <a:endParaRPr lang="en-US" dirty="0"/>
+          </a:p>
+          <a:p>
+            <a:endParaRPr lang="en-US" b="1" dirty="0">
+              <a:solidFill>
+                <a:srgbClr val="0070C0"/>
+              </a:solidFill>
+            </a:endParaRPr>
+          </a:p>
+          <a:p>
+            <a:endParaRPr lang="en-US" dirty="0"/>
+          </a:p>
+          <a:p>
+            <a:endParaRPr lang="en-IN" dirty="0"/>
+          </a:p>
+        </p:txBody>
+      </p:sp>
+      <p:sp>
+        <p:nvSpPr>
+          <p:cNvPr id="6" name="Rectangle 5">
+            <a:extLst>
+              <a:ext uri="{FF2B5EF4-FFF2-40B4-BE49-F238E27FC236}">
+                <a16:creationId xmlns:a16="http://schemas.microsoft.com/office/drawing/2014/main" id="{0037FB8B-E262-4EF6-BA24-D06BD2D70AF4}"/>
+              </a:ext>
+            </a:extLst>
+          </p:cNvPr>
+          <p:cNvSpPr/>
+          <p:nvPr/>
+        </p:nvSpPr>
+        <p:spPr>
+          <a:xfrm>
+            <a:off x="1016950" y="255181"/>
+            <a:ext cx="10593803" cy="6390168"/>
+          </a:xfrm>
+          <a:prstGeom prst="rect">
+            <a:avLst/>
+          </a:prstGeom>
+          <a:noFill/>
+          <a:ln w="9525" cap="flat" cmpd="sng" algn="ctr">
+            <a:solidFill>
+              <a:schemeClr val="accent3"/>
+            </a:solidFill>
+            <a:prstDash val="solid"/>
+            <a:round/>
+            <a:headEnd type="none" w="med" len="med"/>
+            <a:tailEnd type="none" w="med" len="med"/>
+          </a:ln>
+        </p:spPr>
+        <p:style>
+          <a:lnRef idx="0">
+            <a:scrgbClr r="0" g="0" b="0"/>
+          </a:lnRef>
+          <a:fillRef idx="0">
+            <a:scrgbClr r="0" g="0" b="0"/>
+          </a:fillRef>
+          <a:effectRef idx="0">
+            <a:scrgbClr r="0" g="0" b="0"/>
+          </a:effectRef>
+          <a:fontRef idx="minor">
+            <a:schemeClr val="accent3"/>
+          </a:fontRef>
+        </p:style>
+        <p:txBody>
+          <a:bodyPr rtlCol="0" anchor="ctr"/>
+          <a:lstStyle/>
+          <a:p>
+            <a:pPr algn="ctr"/>
+            <a:endParaRPr lang="en-IN" dirty="0"/>
+          </a:p>
+        </p:txBody>
+      </p:sp>
     </p:spTree>
     <p:extLst>
       <p:ext uri="{BB962C8B-B14F-4D97-AF65-F5344CB8AC3E}">
-        <p14:creationId xmlns:p14="http://schemas.microsoft.com/office/powerpoint/2010/main" val="677060937"/>
+        <p14:creationId xmlns:p14="http://schemas.microsoft.com/office/powerpoint/2010/main" val="1453635503"/>
+      </p:ext>
+    </p:extLst>
+  </p:cSld>
+  <p:clrMapOvr>
+    <a:masterClrMapping/>
+  </p:clrMapOvr>
+</p:sld>
+</file>
+
+<file path=ppt/slides/slide3.xml><?xml version="1.0" encoding="utf-8"?>
+<p:sld xmlns:a="http://schemas.openxmlformats.org/drawingml/2006/main" xmlns:r="http://schemas.openxmlformats.org/officeDocument/2006/relationships" xmlns:p="http://schemas.openxmlformats.org/presentationml/2006/main">
+  <p:cSld>
+    <p:spTree>
+      <p:nvGrpSpPr>
+        <p:cNvPr id="1" name=""/>
+        <p:cNvGrpSpPr/>
+        <p:nvPr/>
+      </p:nvGrpSpPr>
+      <p:grpSpPr>
+        <a:xfrm>
+          <a:off x="0" y="0"/>
+          <a:ext cx="0" cy="0"/>
+          <a:chOff x="0" y="0"/>
+          <a:chExt cx="0" cy="0"/>
+        </a:xfrm>
+      </p:grpSpPr>
+      <p:sp>
+        <p:nvSpPr>
+          <p:cNvPr id="6" name="Rectangle 5">
+            <a:extLst>
+              <a:ext uri="{FF2B5EF4-FFF2-40B4-BE49-F238E27FC236}">
+                <a16:creationId xmlns:a16="http://schemas.microsoft.com/office/drawing/2014/main" id="{0037FB8B-E262-4EF6-BA24-D06BD2D70AF4}"/>
+              </a:ext>
+            </a:extLst>
+          </p:cNvPr>
+          <p:cNvSpPr/>
+          <p:nvPr/>
+        </p:nvSpPr>
+        <p:spPr>
+          <a:xfrm>
+            <a:off x="3444949" y="255181"/>
+            <a:ext cx="5730949" cy="6390168"/>
+          </a:xfrm>
+          <a:prstGeom prst="rect">
+            <a:avLst/>
+          </a:prstGeom>
+          <a:noFill/>
+          <a:ln w="9525" cap="flat" cmpd="sng" algn="ctr">
+            <a:solidFill>
+              <a:schemeClr val="accent3"/>
+            </a:solidFill>
+            <a:prstDash val="solid"/>
+            <a:round/>
+            <a:headEnd type="none" w="med" len="med"/>
+            <a:tailEnd type="none" w="med" len="med"/>
+          </a:ln>
+        </p:spPr>
+        <p:style>
+          <a:lnRef idx="0">
+            <a:scrgbClr r="0" g="0" b="0"/>
+          </a:lnRef>
+          <a:fillRef idx="0">
+            <a:scrgbClr r="0" g="0" b="0"/>
+          </a:fillRef>
+          <a:effectRef idx="0">
+            <a:scrgbClr r="0" g="0" b="0"/>
+          </a:effectRef>
+          <a:fontRef idx="minor">
+            <a:schemeClr val="accent3"/>
+          </a:fontRef>
+        </p:style>
+        <p:txBody>
+          <a:bodyPr rtlCol="0" anchor="ctr"/>
+          <a:lstStyle/>
+          <a:p>
+            <a:pPr algn="ctr"/>
+            <a:endParaRPr lang="en-IN" dirty="0"/>
+          </a:p>
+        </p:txBody>
+      </p:sp>
+      <p:pic>
+        <p:nvPicPr>
+          <p:cNvPr id="3" name="Picture 2">
+            <a:extLst>
+              <a:ext uri="{FF2B5EF4-FFF2-40B4-BE49-F238E27FC236}">
+                <a16:creationId xmlns:a16="http://schemas.microsoft.com/office/drawing/2014/main" id="{D5869285-DBB6-4E1E-90FE-F2EF7F694D20}"/>
+              </a:ext>
+            </a:extLst>
+          </p:cNvPr>
+          <p:cNvPicPr>
+            <a:picLocks noChangeAspect="1"/>
+          </p:cNvPicPr>
+          <p:nvPr/>
+        </p:nvPicPr>
+        <p:blipFill>
+          <a:blip r:embed="rId2"/>
+          <a:stretch>
+            <a:fillRect/>
+          </a:stretch>
+        </p:blipFill>
+        <p:spPr>
+          <a:xfrm>
+            <a:off x="3526305" y="326141"/>
+            <a:ext cx="5575092" cy="6255412"/>
+          </a:xfrm>
+          <a:prstGeom prst="rect">
+            <a:avLst/>
+          </a:prstGeom>
+        </p:spPr>
+      </p:pic>
+    </p:spTree>
+    <p:extLst>
+      <p:ext uri="{BB962C8B-B14F-4D97-AF65-F5344CB8AC3E}">
+        <p14:creationId xmlns:p14="http://schemas.microsoft.com/office/powerpoint/2010/main" val="1095850193"/>
+      </p:ext>
+    </p:extLst>
+  </p:cSld>
+  <p:clrMapOvr>
+    <a:masterClrMapping/>
+  </p:clrMapOvr>
+</p:sld>
+</file>
+
+<file path=ppt/slides/slide4.xml><?xml version="1.0" encoding="utf-8"?>
+<p:sld xmlns:a="http://schemas.openxmlformats.org/drawingml/2006/main" xmlns:r="http://schemas.openxmlformats.org/officeDocument/2006/relationships" xmlns:p="http://schemas.openxmlformats.org/presentationml/2006/main">
+  <p:cSld>
+    <p:spTree>
+      <p:nvGrpSpPr>
+        <p:cNvPr id="1" name=""/>
+        <p:cNvGrpSpPr/>
+        <p:nvPr/>
+      </p:nvGrpSpPr>
+      <p:grpSpPr>
+        <a:xfrm>
+          <a:off x="0" y="0"/>
+          <a:ext cx="0" cy="0"/>
+          <a:chOff x="0" y="0"/>
+          <a:chExt cx="0" cy="0"/>
+        </a:xfrm>
+      </p:grpSpPr>
+      <p:sp>
+        <p:nvSpPr>
+          <p:cNvPr id="5" name="TextBox 4">
+            <a:extLst>
+              <a:ext uri="{FF2B5EF4-FFF2-40B4-BE49-F238E27FC236}">
+                <a16:creationId xmlns:a16="http://schemas.microsoft.com/office/drawing/2014/main" id="{7BC385A3-9A0B-476F-9D9E-8B1BCD3E475B}"/>
+              </a:ext>
+            </a:extLst>
+          </p:cNvPr>
+          <p:cNvSpPr txBox="1"/>
+          <p:nvPr/>
+        </p:nvSpPr>
+        <p:spPr>
+          <a:xfrm>
+            <a:off x="446566" y="309748"/>
+            <a:ext cx="9952075" cy="4401205"/>
+          </a:xfrm>
+          <a:prstGeom prst="rect">
+            <a:avLst/>
+          </a:prstGeom>
+          <a:noFill/>
+        </p:spPr>
+        <p:txBody>
+          <a:bodyPr wrap="square">
+            <a:spAutoFit/>
+          </a:bodyPr>
+          <a:lstStyle/>
+          <a:p>
+            <a:pPr algn="l"/>
+            <a:r>
+              <a:rPr lang="en-US" b="1" i="0" dirty="0">
+                <a:solidFill>
+                  <a:srgbClr val="000000"/>
+                </a:solidFill>
+                <a:effectLst/>
+                <a:latin typeface="Nunito Sans" pitchFamily="2" charset="0"/>
+              </a:rPr>
+              <a:t>The Life of Dynamo’s put() &amp; get() Operations</a:t>
+            </a:r>
+          </a:p>
+          <a:p>
+            <a:pPr algn="l"/>
+            <a:endParaRPr lang="en-US" b="1" dirty="0">
+              <a:solidFill>
+                <a:srgbClr val="000000"/>
+              </a:solidFill>
+              <a:latin typeface="Nunito Sans" pitchFamily="2" charset="0"/>
+            </a:endParaRPr>
+          </a:p>
+          <a:p>
+            <a:r>
+              <a:rPr lang="en-US" b="1" i="0" dirty="0">
+                <a:solidFill>
+                  <a:srgbClr val="0070C0"/>
+                </a:solidFill>
+                <a:effectLst/>
+                <a:latin typeface="Droid Serif"/>
+              </a:rPr>
+              <a:t>Dynamo is also called a zero-hop DHT, as the client can directly contact the node that holds the required data.</a:t>
+            </a:r>
+            <a:endParaRPr lang="en-US" altLang="en-US" b="1" dirty="0">
+              <a:solidFill>
+                <a:srgbClr val="0070C0"/>
+              </a:solidFill>
+              <a:latin typeface="Droid Serif"/>
+            </a:endParaRPr>
+          </a:p>
+          <a:p>
+            <a:endParaRPr kumimoji="0" lang="en-US" altLang="en-US" sz="1800" b="0" i="0" u="none" strike="noStrike" cap="none" normalizeH="0" baseline="0" dirty="0">
+              <a:ln>
+                <a:noFill/>
+              </a:ln>
+              <a:solidFill>
+                <a:srgbClr val="3D3D4E"/>
+              </a:solidFill>
+              <a:effectLst/>
+              <a:latin typeface="Droid Serif"/>
+            </a:endParaRPr>
+          </a:p>
+          <a:p>
+            <a:r>
+              <a:rPr kumimoji="0" lang="en-US" altLang="en-US" sz="1800" b="0" i="0" u="none" strike="noStrike" cap="none" normalizeH="0" baseline="0" dirty="0">
+                <a:ln>
+                  <a:noFill/>
+                </a:ln>
+                <a:solidFill>
+                  <a:srgbClr val="3D3D4E"/>
+                </a:solidFill>
+                <a:effectLst/>
+                <a:latin typeface="Droid Serif"/>
+              </a:rPr>
+              <a:t>Dynamo clients can use one of the two strategies to choose a node for their </a:t>
+            </a:r>
+            <a:r>
+              <a:rPr kumimoji="0" lang="en-US" altLang="en-US" sz="1600" b="0" i="0" u="none" strike="noStrike" cap="none" normalizeH="0" baseline="0" dirty="0">
+                <a:ln>
+                  <a:noFill/>
+                </a:ln>
+                <a:solidFill>
+                  <a:srgbClr val="C7254E"/>
+                </a:solidFill>
+                <a:effectLst/>
+                <a:latin typeface="Menlo"/>
+              </a:rPr>
+              <a:t>get()</a:t>
+            </a:r>
+            <a:r>
+              <a:rPr kumimoji="0" lang="en-US" altLang="en-US" sz="1800" b="0" i="0" u="none" strike="noStrike" cap="none" normalizeH="0" baseline="0" dirty="0">
+                <a:ln>
+                  <a:noFill/>
+                </a:ln>
+                <a:solidFill>
+                  <a:srgbClr val="3D3D4E"/>
+                </a:solidFill>
+                <a:effectLst/>
+                <a:latin typeface="Droid Serif"/>
+              </a:rPr>
+              <a:t> and </a:t>
+            </a:r>
+            <a:r>
+              <a:rPr kumimoji="0" lang="en-US" altLang="en-US" sz="1600" b="0" i="0" u="none" strike="noStrike" cap="none" normalizeH="0" baseline="0" dirty="0">
+                <a:ln>
+                  <a:noFill/>
+                </a:ln>
+                <a:solidFill>
+                  <a:srgbClr val="C7254E"/>
+                </a:solidFill>
+                <a:effectLst/>
+                <a:latin typeface="Menlo"/>
+              </a:rPr>
+              <a:t>put()</a:t>
+            </a:r>
+            <a:r>
+              <a:rPr kumimoji="0" lang="en-US" altLang="en-US" sz="1800" b="0" i="0" u="none" strike="noStrike" cap="none" normalizeH="0" baseline="0" dirty="0">
+                <a:ln>
+                  <a:noFill/>
+                </a:ln>
+                <a:solidFill>
+                  <a:srgbClr val="3D3D4E"/>
+                </a:solidFill>
+                <a:effectLst/>
+                <a:latin typeface="Droid Serif"/>
+              </a:rPr>
+              <a:t> requests</a:t>
+            </a:r>
+          </a:p>
+          <a:p>
+            <a:endParaRPr lang="en-US" altLang="en-US" dirty="0">
+              <a:solidFill>
+                <a:srgbClr val="3D3D4E"/>
+              </a:solidFill>
+              <a:latin typeface="Droid Serif"/>
+            </a:endParaRPr>
+          </a:p>
+          <a:p>
+            <a:pPr marL="342900" indent="-342900">
+              <a:buFont typeface="+mj-lt"/>
+              <a:buAutoNum type="arabicPeriod"/>
+            </a:pPr>
+            <a:r>
+              <a:rPr lang="en-US" dirty="0">
+                <a:solidFill>
+                  <a:srgbClr val="3D3D4E"/>
+                </a:solidFill>
+                <a:latin typeface="Droid Serif"/>
+              </a:rPr>
+              <a:t>Clients can route their requests through a generic load balancer.</a:t>
+            </a:r>
+          </a:p>
+          <a:p>
+            <a:pPr marL="342900" indent="-342900">
+              <a:buFont typeface="+mj-lt"/>
+              <a:buAutoNum type="arabicPeriod"/>
+            </a:pPr>
+            <a:r>
+              <a:rPr lang="en-US" b="0" i="0" dirty="0">
+                <a:solidFill>
+                  <a:srgbClr val="3D3D4E"/>
+                </a:solidFill>
+                <a:effectLst/>
+                <a:latin typeface="Droid Serif"/>
+              </a:rPr>
+              <a:t>Clients can use a partition-aware client library that routes the requests to the appropriate coordinator nodes with lower latency.</a:t>
+            </a:r>
+          </a:p>
+          <a:p>
+            <a:pPr marL="342900" indent="-342900">
+              <a:buFont typeface="+mj-lt"/>
+              <a:buAutoNum type="arabicPeriod"/>
+            </a:pPr>
+            <a:endParaRPr kumimoji="0" lang="en-US" altLang="en-US" sz="1000" u="none" strike="noStrike" cap="none" normalizeH="0" baseline="0" dirty="0">
+              <a:ln>
+                <a:noFill/>
+              </a:ln>
+              <a:solidFill>
+                <a:srgbClr val="3D3D4E"/>
+              </a:solidFill>
+              <a:latin typeface="Droid Serif"/>
+            </a:endParaRPr>
+          </a:p>
+          <a:p>
+            <a:r>
+              <a:rPr lang="en-US" altLang="en-US" dirty="0">
+                <a:solidFill>
+                  <a:srgbClr val="3D3D4E"/>
+                </a:solidFill>
+                <a:latin typeface="Droid Serif"/>
+              </a:rPr>
+              <a:t>Off course 2</a:t>
+            </a:r>
+            <a:r>
+              <a:rPr lang="en-US" altLang="en-US" baseline="30000" dirty="0">
+                <a:solidFill>
+                  <a:srgbClr val="3D3D4E"/>
+                </a:solidFill>
+                <a:latin typeface="Droid Serif"/>
+              </a:rPr>
+              <a:t>nd</a:t>
+            </a:r>
+            <a:r>
+              <a:rPr lang="en-US" altLang="en-US" dirty="0">
+                <a:solidFill>
+                  <a:srgbClr val="3D3D4E"/>
+                </a:solidFill>
+                <a:latin typeface="Droid Serif"/>
+              </a:rPr>
+              <a:t> option are good for system, so let’s understand the 2</a:t>
+            </a:r>
+            <a:r>
+              <a:rPr lang="en-US" altLang="en-US" baseline="30000" dirty="0">
+                <a:solidFill>
+                  <a:srgbClr val="3D3D4E"/>
+                </a:solidFill>
+                <a:latin typeface="Droid Serif"/>
+              </a:rPr>
+              <a:t>nd</a:t>
+            </a:r>
+            <a:r>
+              <a:rPr lang="en-US" altLang="en-US" dirty="0">
+                <a:solidFill>
+                  <a:srgbClr val="3D3D4E"/>
+                </a:solidFill>
+                <a:latin typeface="Droid Serif"/>
+              </a:rPr>
+              <a:t> in more detailed.</a:t>
+            </a:r>
+          </a:p>
+          <a:p>
+            <a:endParaRPr lang="en-US" altLang="en-US" dirty="0">
+              <a:solidFill>
+                <a:srgbClr val="3D3D4E"/>
+              </a:solidFill>
+              <a:latin typeface="Droid Serif"/>
+            </a:endParaRPr>
+          </a:p>
+          <a:p>
+            <a:pPr algn="l"/>
+            <a:r>
+              <a:rPr lang="en-US" b="0" i="0" dirty="0">
+                <a:solidFill>
+                  <a:srgbClr val="3D3D4E"/>
+                </a:solidFill>
+                <a:effectLst/>
+                <a:latin typeface="Droid Serif"/>
+              </a:rPr>
+              <a:t>Because of this option, Dynamo is also called a </a:t>
+            </a:r>
+            <a:r>
+              <a:rPr lang="en-US" b="1" i="0" dirty="0">
+                <a:solidFill>
+                  <a:srgbClr val="3D3D4E"/>
+                </a:solidFill>
+                <a:effectLst/>
+                <a:latin typeface="Droid Serif"/>
+              </a:rPr>
+              <a:t>zero-hop DHT</a:t>
+            </a:r>
+            <a:r>
+              <a:rPr lang="en-US" b="0" i="0" dirty="0">
+                <a:solidFill>
+                  <a:srgbClr val="3D3D4E"/>
+                </a:solidFill>
+                <a:effectLst/>
+                <a:latin typeface="Droid Serif"/>
+              </a:rPr>
+              <a:t>, as the client can directly contact the node that holds the required data</a:t>
+            </a:r>
+            <a:endParaRPr lang="en-US" dirty="0">
+              <a:solidFill>
+                <a:srgbClr val="3D3D4E"/>
+              </a:solidFill>
+              <a:latin typeface="Droid Serif"/>
+            </a:endParaRPr>
+          </a:p>
+          <a:p>
+            <a:pPr algn="l"/>
+            <a:endParaRPr lang="en-US" b="1" i="0" dirty="0">
+              <a:solidFill>
+                <a:srgbClr val="000000"/>
+              </a:solidFill>
+              <a:effectLst/>
+              <a:latin typeface="Nunito Sans" pitchFamily="2" charset="0"/>
+            </a:endParaRPr>
+          </a:p>
+        </p:txBody>
+      </p:sp>
+    </p:spTree>
+    <p:extLst>
+      <p:ext uri="{BB962C8B-B14F-4D97-AF65-F5344CB8AC3E}">
+        <p14:creationId xmlns:p14="http://schemas.microsoft.com/office/powerpoint/2010/main" val="527738026"/>
+      </p:ext>
+    </p:extLst>
+  </p:cSld>
+  <p:clrMapOvr>
+    <a:masterClrMapping/>
+  </p:clrMapOvr>
+</p:sld>
+</file>
+
+<file path=ppt/slides/slide5.xml><?xml version="1.0" encoding="utf-8"?>
+<p:sld xmlns:a="http://schemas.openxmlformats.org/drawingml/2006/main" xmlns:r="http://schemas.openxmlformats.org/officeDocument/2006/relationships" xmlns:p="http://schemas.openxmlformats.org/presentationml/2006/main">
+  <p:cSld>
+    <p:spTree>
+      <p:nvGrpSpPr>
+        <p:cNvPr id="1" name=""/>
+        <p:cNvGrpSpPr/>
+        <p:nvPr/>
+      </p:nvGrpSpPr>
+      <p:grpSpPr>
+        <a:xfrm>
+          <a:off x="0" y="0"/>
+          <a:ext cx="0" cy="0"/>
+          <a:chOff x="0" y="0"/>
+          <a:chExt cx="0" cy="0"/>
+        </a:xfrm>
+      </p:grpSpPr>
+      <p:pic>
+        <p:nvPicPr>
+          <p:cNvPr id="3" name="Picture 2">
+            <a:extLst>
+              <a:ext uri="{FF2B5EF4-FFF2-40B4-BE49-F238E27FC236}">
+                <a16:creationId xmlns:a16="http://schemas.microsoft.com/office/drawing/2014/main" id="{39231CA4-6E61-4CC7-B45D-AE5F958174A0}"/>
+              </a:ext>
+            </a:extLst>
+          </p:cNvPr>
+          <p:cNvPicPr>
+            <a:picLocks noChangeAspect="1"/>
+          </p:cNvPicPr>
+          <p:nvPr/>
+        </p:nvPicPr>
+        <p:blipFill>
+          <a:blip r:embed="rId2"/>
+          <a:stretch>
+            <a:fillRect/>
+          </a:stretch>
+        </p:blipFill>
+        <p:spPr>
+          <a:xfrm>
+            <a:off x="1058197" y="1318437"/>
+            <a:ext cx="9843906" cy="3574546"/>
+          </a:xfrm>
+          <a:prstGeom prst="rect">
+            <a:avLst/>
+          </a:prstGeom>
+        </p:spPr>
+      </p:pic>
+      <p:sp>
+        <p:nvSpPr>
+          <p:cNvPr id="4" name="Rectangle 3">
+            <a:extLst>
+              <a:ext uri="{FF2B5EF4-FFF2-40B4-BE49-F238E27FC236}">
+                <a16:creationId xmlns:a16="http://schemas.microsoft.com/office/drawing/2014/main" id="{32DE10CE-EB40-411E-9279-35A904BE243C}"/>
+              </a:ext>
+            </a:extLst>
+          </p:cNvPr>
+          <p:cNvSpPr/>
+          <p:nvPr/>
+        </p:nvSpPr>
+        <p:spPr>
+          <a:xfrm>
+            <a:off x="850612" y="1127051"/>
+            <a:ext cx="10281676" cy="3923414"/>
+          </a:xfrm>
+          <a:prstGeom prst="rect">
+            <a:avLst/>
+          </a:prstGeom>
+          <a:noFill/>
+          <a:ln w="9525" cap="flat" cmpd="sng" algn="ctr">
+            <a:solidFill>
+              <a:schemeClr val="accent3"/>
+            </a:solidFill>
+            <a:prstDash val="solid"/>
+            <a:round/>
+            <a:headEnd type="none" w="med" len="med"/>
+            <a:tailEnd type="none" w="med" len="med"/>
+          </a:ln>
+        </p:spPr>
+        <p:style>
+          <a:lnRef idx="0">
+            <a:scrgbClr r="0" g="0" b="0"/>
+          </a:lnRef>
+          <a:fillRef idx="0">
+            <a:scrgbClr r="0" g="0" b="0"/>
+          </a:fillRef>
+          <a:effectRef idx="0">
+            <a:scrgbClr r="0" g="0" b="0"/>
+          </a:effectRef>
+          <a:fontRef idx="minor">
+            <a:schemeClr val="accent3"/>
+          </a:fontRef>
+        </p:style>
+        <p:txBody>
+          <a:bodyPr rtlCol="0" anchor="ctr"/>
+          <a:lstStyle/>
+          <a:p>
+            <a:pPr algn="ctr"/>
+            <a:endParaRPr lang="en-IN" dirty="0"/>
+          </a:p>
+        </p:txBody>
+      </p:sp>
+    </p:spTree>
+    <p:extLst>
+      <p:ext uri="{BB962C8B-B14F-4D97-AF65-F5344CB8AC3E}">
+        <p14:creationId xmlns:p14="http://schemas.microsoft.com/office/powerpoint/2010/main" val="4185467297"/>
+      </p:ext>
+    </p:extLst>
+  </p:cSld>
+  <p:clrMapOvr>
+    <a:masterClrMapping/>
+  </p:clrMapOvr>
+</p:sld>
+</file>
+
+<file path=ppt/slides/slide6.xml><?xml version="1.0" encoding="utf-8"?>
+<p:sld xmlns:a="http://schemas.openxmlformats.org/drawingml/2006/main" xmlns:r="http://schemas.openxmlformats.org/officeDocument/2006/relationships" xmlns:p="http://schemas.openxmlformats.org/presentationml/2006/main">
+  <p:cSld>
+    <p:spTree>
+      <p:nvGrpSpPr>
+        <p:cNvPr id="1" name=""/>
+        <p:cNvGrpSpPr/>
+        <p:nvPr/>
+      </p:nvGrpSpPr>
+      <p:grpSpPr>
+        <a:xfrm>
+          <a:off x="0" y="0"/>
+          <a:ext cx="0" cy="0"/>
+          <a:chOff x="0" y="0"/>
+          <a:chExt cx="0" cy="0"/>
+        </a:xfrm>
+      </p:grpSpPr>
+      <p:sp>
+        <p:nvSpPr>
+          <p:cNvPr id="5" name="TextBox 4">
+            <a:extLst>
+              <a:ext uri="{FF2B5EF4-FFF2-40B4-BE49-F238E27FC236}">
+                <a16:creationId xmlns:a16="http://schemas.microsoft.com/office/drawing/2014/main" id="{E6EE6FD9-18FE-48DF-BCB2-88F1D7F6C110}"/>
+              </a:ext>
+            </a:extLst>
+          </p:cNvPr>
+          <p:cNvSpPr txBox="1"/>
+          <p:nvPr/>
+        </p:nvSpPr>
+        <p:spPr>
+          <a:xfrm>
+            <a:off x="380113" y="416073"/>
+            <a:ext cx="7562407" cy="6186309"/>
+          </a:xfrm>
+          <a:prstGeom prst="rect">
+            <a:avLst/>
+          </a:prstGeom>
+          <a:noFill/>
+        </p:spPr>
+        <p:txBody>
+          <a:bodyPr wrap="square">
+            <a:spAutoFit/>
+          </a:bodyPr>
+          <a:lstStyle/>
+          <a:p>
+            <a:pPr algn="l"/>
+            <a:r>
+              <a:rPr lang="en-IN" b="1" i="0" dirty="0">
+                <a:effectLst/>
+                <a:latin typeface="Nunito Sans" pitchFamily="2" charset="0"/>
+              </a:rPr>
+              <a:t>Consistency protocol</a:t>
+            </a:r>
+          </a:p>
+          <a:p>
+            <a:pPr algn="l">
+              <a:buFont typeface="Arial" panose="020B0604020202020204" pitchFamily="34" charset="0"/>
+              <a:buChar char="•"/>
+            </a:pPr>
+            <a:r>
+              <a:rPr lang="en-US" b="0" i="0" dirty="0">
+                <a:solidFill>
+                  <a:srgbClr val="3D3D4E"/>
+                </a:solidFill>
+                <a:effectLst/>
+                <a:latin typeface="Droid Serif"/>
+              </a:rPr>
+              <a:t>A Common (</a:t>
+            </a:r>
+            <a:r>
+              <a:rPr lang="en-US" b="0" i="0" dirty="0">
+                <a:solidFill>
+                  <a:srgbClr val="3D3D4E"/>
+                </a:solidFill>
+                <a:effectLst/>
+                <a:latin typeface="KaTeX_Main"/>
+              </a:rPr>
+              <a:t>N, R, W</a:t>
+            </a:r>
+            <a:r>
+              <a:rPr lang="en-US" b="0" i="0" dirty="0">
+                <a:solidFill>
+                  <a:srgbClr val="3D3D4E"/>
+                </a:solidFill>
+                <a:effectLst/>
+                <a:latin typeface="Droid Serif"/>
+              </a:rPr>
+              <a:t>) configuration used by Dynamo is (3, 2, 2).</a:t>
+            </a:r>
+          </a:p>
+          <a:p>
+            <a:pPr marL="742950" lvl="1" indent="-285750" algn="l">
+              <a:buFont typeface="Arial" panose="020B0604020202020204" pitchFamily="34" charset="0"/>
+              <a:buChar char="•"/>
+            </a:pPr>
+            <a:r>
+              <a:rPr lang="en-US" b="0" i="0" dirty="0">
+                <a:solidFill>
+                  <a:srgbClr val="3D3D4E"/>
+                </a:solidFill>
+                <a:effectLst/>
+                <a:latin typeface="Droid Serif"/>
+              </a:rPr>
+              <a:t>(3, 3, 1): fast </a:t>
+            </a:r>
+            <a:r>
+              <a:rPr lang="en-US" b="0" i="1" dirty="0">
+                <a:solidFill>
+                  <a:srgbClr val="3D3D4E"/>
+                </a:solidFill>
+                <a:effectLst/>
+                <a:latin typeface="KaTeX_Math"/>
+              </a:rPr>
+              <a:t>W</a:t>
+            </a:r>
+            <a:r>
+              <a:rPr lang="en-US" b="0" i="0" dirty="0">
+                <a:solidFill>
+                  <a:srgbClr val="3D3D4E"/>
+                </a:solidFill>
+                <a:effectLst/>
+                <a:latin typeface="Droid Serif"/>
+              </a:rPr>
+              <a:t>, slow </a:t>
+            </a:r>
+            <a:r>
+              <a:rPr lang="en-US" b="0" i="1" dirty="0">
+                <a:solidFill>
+                  <a:srgbClr val="3D3D4E"/>
+                </a:solidFill>
+                <a:effectLst/>
+                <a:latin typeface="KaTeX_Math"/>
+              </a:rPr>
+              <a:t>R</a:t>
+            </a:r>
+            <a:r>
+              <a:rPr lang="en-US" b="0" i="0" dirty="0">
+                <a:solidFill>
+                  <a:srgbClr val="3D3D4E"/>
+                </a:solidFill>
+                <a:effectLst/>
+                <a:latin typeface="Droid Serif"/>
+              </a:rPr>
+              <a:t>, not very durable</a:t>
+            </a:r>
+          </a:p>
+          <a:p>
+            <a:pPr marL="742950" lvl="1" indent="-285750" algn="l">
+              <a:buFont typeface="Arial" panose="020B0604020202020204" pitchFamily="34" charset="0"/>
+              <a:buChar char="•"/>
+            </a:pPr>
+            <a:r>
+              <a:rPr lang="en-US" b="0" i="0" dirty="0">
+                <a:solidFill>
+                  <a:srgbClr val="3D3D4E"/>
+                </a:solidFill>
+                <a:effectLst/>
+                <a:latin typeface="Droid Serif"/>
+              </a:rPr>
+              <a:t>(3, 1, 3): fast </a:t>
+            </a:r>
+            <a:r>
+              <a:rPr lang="en-US" b="0" i="1" dirty="0">
+                <a:solidFill>
+                  <a:srgbClr val="3D3D4E"/>
+                </a:solidFill>
+                <a:effectLst/>
+                <a:latin typeface="KaTeX_Math"/>
+              </a:rPr>
+              <a:t>R</a:t>
+            </a:r>
+            <a:r>
+              <a:rPr lang="en-US" b="0" i="0" dirty="0">
+                <a:solidFill>
+                  <a:srgbClr val="3D3D4E"/>
+                </a:solidFill>
+                <a:effectLst/>
+                <a:latin typeface="Droid Serif"/>
+              </a:rPr>
+              <a:t>, slow </a:t>
+            </a:r>
+            <a:r>
+              <a:rPr lang="en-US" b="0" i="1" dirty="0">
+                <a:solidFill>
+                  <a:srgbClr val="3D3D4E"/>
+                </a:solidFill>
+                <a:effectLst/>
+                <a:latin typeface="KaTeX_Math"/>
+              </a:rPr>
+              <a:t>W</a:t>
+            </a:r>
+            <a:r>
+              <a:rPr lang="en-US" b="0" i="0" dirty="0">
+                <a:solidFill>
+                  <a:srgbClr val="3D3D4E"/>
+                </a:solidFill>
+                <a:effectLst/>
+                <a:latin typeface="Droid Serif"/>
+              </a:rPr>
+              <a:t>, durable</a:t>
+            </a:r>
+          </a:p>
+          <a:p>
+            <a:pPr marL="742950" lvl="1" indent="-285750" algn="l">
+              <a:buFont typeface="Arial" panose="020B0604020202020204" pitchFamily="34" charset="0"/>
+              <a:buChar char="•"/>
+            </a:pPr>
+            <a:endParaRPr lang="en-US" dirty="0">
+              <a:solidFill>
+                <a:srgbClr val="3D3D4E"/>
+              </a:solidFill>
+              <a:latin typeface="Droid Serif"/>
+            </a:endParaRPr>
+          </a:p>
+          <a:p>
+            <a:r>
+              <a:rPr lang="en-US" b="0" i="0" dirty="0">
+                <a:solidFill>
+                  <a:srgbClr val="3D3D4E"/>
+                </a:solidFill>
+                <a:effectLst/>
+                <a:latin typeface="Droid Serif"/>
+              </a:rPr>
+              <a:t>In this model, the latency of a get() (or put()) operation depends upon the slowest of the replicas. For this reason, R and W are usually configured to be less than NN to provide better latency.</a:t>
+            </a:r>
+          </a:p>
+          <a:p>
+            <a:endParaRPr lang="en-US" dirty="0">
+              <a:solidFill>
+                <a:srgbClr val="3D3D4E"/>
+              </a:solidFill>
+              <a:latin typeface="Droid Serif"/>
+            </a:endParaRPr>
+          </a:p>
+          <a:p>
+            <a:r>
+              <a:rPr lang="en-IN" b="1" i="0" dirty="0">
+                <a:effectLst/>
+                <a:latin typeface="Nunito Sans" pitchFamily="2" charset="0"/>
+              </a:rPr>
+              <a:t>‘put()’ process</a:t>
+            </a:r>
+          </a:p>
+          <a:p>
+            <a:endParaRPr lang="en-IN" b="1" i="0" dirty="0">
+              <a:effectLst/>
+              <a:latin typeface="Nunito Sans" pitchFamily="2" charset="0"/>
+            </a:endParaRPr>
+          </a:p>
+          <a:p>
+            <a:r>
+              <a:rPr lang="en-US" b="0" i="0" dirty="0">
+                <a:solidFill>
+                  <a:srgbClr val="3D3D4E"/>
+                </a:solidFill>
+                <a:effectLst/>
+                <a:latin typeface="Droid Serif"/>
+              </a:rPr>
+              <a:t>Dynamo’s put() request will go through the following steps:</a:t>
+            </a:r>
+          </a:p>
+          <a:p>
+            <a:endParaRPr lang="en-US" b="0" i="0" dirty="0">
+              <a:solidFill>
+                <a:srgbClr val="3D3D4E"/>
+              </a:solidFill>
+              <a:effectLst/>
+              <a:latin typeface="Droid Serif"/>
+            </a:endParaRPr>
+          </a:p>
+          <a:p>
+            <a:pPr marL="285750" indent="-285750">
+              <a:buFont typeface="Arial" panose="020B0604020202020204" pitchFamily="34" charset="0"/>
+              <a:buChar char="•"/>
+            </a:pPr>
+            <a:r>
+              <a:rPr lang="en-US" b="0" i="0" dirty="0">
+                <a:solidFill>
+                  <a:srgbClr val="3D3D4E"/>
+                </a:solidFill>
+                <a:effectLst/>
+                <a:latin typeface="Droid Serif"/>
+              </a:rPr>
+              <a:t>The coordinator generates a new data version and vector clock component. Saves new data locally.</a:t>
+            </a:r>
+          </a:p>
+          <a:p>
+            <a:endParaRPr lang="en-US" b="0" i="0" dirty="0">
+              <a:solidFill>
+                <a:srgbClr val="3D3D4E"/>
+              </a:solidFill>
+              <a:effectLst/>
+              <a:latin typeface="Droid Serif"/>
+            </a:endParaRPr>
+          </a:p>
+          <a:p>
+            <a:pPr marL="285750" indent="-285750">
+              <a:buFont typeface="Arial" panose="020B0604020202020204" pitchFamily="34" charset="0"/>
+              <a:buChar char="•"/>
+            </a:pPr>
+            <a:r>
+              <a:rPr lang="en-US" dirty="0">
+                <a:solidFill>
+                  <a:srgbClr val="3D3D4E"/>
+                </a:solidFill>
+                <a:latin typeface="Droid Serif"/>
+              </a:rPr>
+              <a:t>Sends the write request to N−1 highest-ranked healthy nodes from the preference list.</a:t>
+            </a:r>
+          </a:p>
+          <a:p>
+            <a:endParaRPr lang="en-US" dirty="0">
+              <a:solidFill>
+                <a:srgbClr val="3D3D4E"/>
+              </a:solidFill>
+              <a:latin typeface="Droid Serif"/>
+            </a:endParaRPr>
+          </a:p>
+          <a:p>
+            <a:pPr marL="285750" indent="-285750">
+              <a:buFont typeface="Arial" panose="020B0604020202020204" pitchFamily="34" charset="0"/>
+              <a:buChar char="•"/>
+            </a:pPr>
+            <a:r>
+              <a:rPr lang="en-US" b="0" i="0" dirty="0">
+                <a:solidFill>
+                  <a:srgbClr val="3D3D4E"/>
+                </a:solidFill>
+                <a:effectLst/>
+                <a:latin typeface="Droid Serif"/>
+              </a:rPr>
+              <a:t>The put() operation is considered successful after receiving W−1 confirmation.</a:t>
+            </a:r>
+          </a:p>
+          <a:p>
+            <a:pPr algn="l"/>
+            <a:endParaRPr lang="en-IN" b="1" i="0" dirty="0">
+              <a:effectLst/>
+              <a:latin typeface="Nunito Sans" pitchFamily="2" charset="0"/>
+            </a:endParaRPr>
+          </a:p>
+        </p:txBody>
+      </p:sp>
+    </p:spTree>
+    <p:extLst>
+      <p:ext uri="{BB962C8B-B14F-4D97-AF65-F5344CB8AC3E}">
+        <p14:creationId xmlns:p14="http://schemas.microsoft.com/office/powerpoint/2010/main" val="1768025252"/>
+      </p:ext>
+    </p:extLst>
+  </p:cSld>
+  <p:clrMapOvr>
+    <a:masterClrMapping/>
+  </p:clrMapOvr>
+</p:sld>
+</file>
+
+<file path=ppt/slides/slide7.xml><?xml version="1.0" encoding="utf-8"?>
+<p:sld xmlns:a="http://schemas.openxmlformats.org/drawingml/2006/main" xmlns:r="http://schemas.openxmlformats.org/officeDocument/2006/relationships" xmlns:p="http://schemas.openxmlformats.org/presentationml/2006/main">
+  <p:cSld>
+    <p:spTree>
+      <p:nvGrpSpPr>
+        <p:cNvPr id="1" name=""/>
+        <p:cNvGrpSpPr/>
+        <p:nvPr/>
+      </p:nvGrpSpPr>
+      <p:grpSpPr>
+        <a:xfrm>
+          <a:off x="0" y="0"/>
+          <a:ext cx="0" cy="0"/>
+          <a:chOff x="0" y="0"/>
+          <a:chExt cx="0" cy="0"/>
+        </a:xfrm>
+      </p:grpSpPr>
+      <p:sp>
+        <p:nvSpPr>
+          <p:cNvPr id="5" name="TextBox 4">
+            <a:extLst>
+              <a:ext uri="{FF2B5EF4-FFF2-40B4-BE49-F238E27FC236}">
+                <a16:creationId xmlns:a16="http://schemas.microsoft.com/office/drawing/2014/main" id="{E6EE6FD9-18FE-48DF-BCB2-88F1D7F6C110}"/>
+              </a:ext>
+            </a:extLst>
+          </p:cNvPr>
+          <p:cNvSpPr txBox="1"/>
+          <p:nvPr/>
+        </p:nvSpPr>
+        <p:spPr>
+          <a:xfrm>
+            <a:off x="380113" y="416073"/>
+            <a:ext cx="11443292" cy="3416320"/>
+          </a:xfrm>
+          <a:prstGeom prst="rect">
+            <a:avLst/>
+          </a:prstGeom>
+          <a:noFill/>
+        </p:spPr>
+        <p:txBody>
+          <a:bodyPr wrap="square">
+            <a:spAutoFit/>
+          </a:bodyPr>
+          <a:lstStyle/>
+          <a:p>
+            <a:pPr algn="l"/>
+            <a:r>
+              <a:rPr lang="en-IN" b="1" i="0" dirty="0">
+                <a:effectLst/>
+                <a:latin typeface="Nunito Sans" pitchFamily="2" charset="0"/>
+              </a:rPr>
+              <a:t>Consistency protocol</a:t>
+            </a:r>
+          </a:p>
+          <a:p>
+            <a:pPr algn="l"/>
+            <a:endParaRPr lang="en-IN" b="1" i="0" dirty="0">
+              <a:effectLst/>
+              <a:latin typeface="Nunito Sans" pitchFamily="2" charset="0"/>
+            </a:endParaRPr>
+          </a:p>
+          <a:p>
+            <a:pPr algn="l"/>
+            <a:r>
+              <a:rPr lang="en-US" b="1" dirty="0">
+                <a:latin typeface="Nunito Sans" pitchFamily="2" charset="0"/>
+              </a:rPr>
+              <a:t>‘get()’ process</a:t>
+            </a:r>
+          </a:p>
+          <a:p>
+            <a:pPr algn="l"/>
+            <a:endParaRPr lang="en-US" dirty="0">
+              <a:solidFill>
+                <a:srgbClr val="3D3D4E"/>
+              </a:solidFill>
+              <a:latin typeface="Droid Serif"/>
+            </a:endParaRPr>
+          </a:p>
+          <a:p>
+            <a:pPr algn="l"/>
+            <a:r>
+              <a:rPr lang="en-US" dirty="0">
+                <a:solidFill>
+                  <a:srgbClr val="3D3D4E"/>
+                </a:solidFill>
+                <a:latin typeface="Droid Serif"/>
+              </a:rPr>
+              <a:t>Dynamo’s get() request will go through the following steps:</a:t>
+            </a:r>
+          </a:p>
+          <a:p>
+            <a:pPr algn="l"/>
+            <a:endParaRPr lang="en-US" dirty="0">
+              <a:solidFill>
+                <a:srgbClr val="3D3D4E"/>
+              </a:solidFill>
+              <a:latin typeface="Droid Serif"/>
+            </a:endParaRPr>
+          </a:p>
+          <a:p>
+            <a:pPr marL="285750" indent="-285750" algn="l">
+              <a:buFont typeface="Arial" panose="020B0604020202020204" pitchFamily="34" charset="0"/>
+              <a:buChar char="•"/>
+            </a:pPr>
+            <a:r>
+              <a:rPr lang="en-US" dirty="0">
+                <a:solidFill>
+                  <a:srgbClr val="3D3D4E"/>
+                </a:solidFill>
+                <a:latin typeface="Droid Serif"/>
+              </a:rPr>
+              <a:t>The coordinator requests the data version from N−1 highest-ranked healthy nodes from the preference list.</a:t>
+            </a:r>
+          </a:p>
+          <a:p>
+            <a:pPr algn="l"/>
+            <a:endParaRPr lang="en-US" dirty="0">
+              <a:solidFill>
+                <a:srgbClr val="3D3D4E"/>
+              </a:solidFill>
+              <a:latin typeface="Droid Serif"/>
+            </a:endParaRPr>
+          </a:p>
+          <a:p>
+            <a:pPr marL="285750" indent="-285750" algn="l">
+              <a:buFont typeface="Arial" panose="020B0604020202020204" pitchFamily="34" charset="0"/>
+              <a:buChar char="•"/>
+            </a:pPr>
+            <a:r>
+              <a:rPr lang="en-US" dirty="0">
+                <a:solidFill>
+                  <a:srgbClr val="3D3D4E"/>
+                </a:solidFill>
+                <a:latin typeface="Droid Serif"/>
+              </a:rPr>
+              <a:t>Waits until R−1 replies.</a:t>
+            </a:r>
+          </a:p>
+          <a:p>
+            <a:pPr algn="l"/>
+            <a:endParaRPr lang="en-US" dirty="0">
+              <a:solidFill>
+                <a:srgbClr val="3D3D4E"/>
+              </a:solidFill>
+              <a:latin typeface="Droid Serif"/>
+            </a:endParaRPr>
+          </a:p>
+          <a:p>
+            <a:pPr algn="l"/>
+            <a:r>
+              <a:rPr lang="en-US" dirty="0">
+                <a:solidFill>
+                  <a:srgbClr val="3D3D4E"/>
+                </a:solidFill>
+                <a:latin typeface="Droid Serif"/>
+              </a:rPr>
+              <a:t>Coordinator handles causal data versions through a vector clock. Returns all relevant data versions to the caller.</a:t>
+            </a:r>
+            <a:endParaRPr lang="en-IN" dirty="0">
+              <a:solidFill>
+                <a:srgbClr val="3D3D4E"/>
+              </a:solidFill>
+              <a:latin typeface="Droid Serif"/>
+            </a:endParaRPr>
+          </a:p>
+          <a:p>
+            <a:pPr algn="l"/>
+            <a:endParaRPr lang="en-IN" b="1" i="0" dirty="0">
+              <a:effectLst/>
+              <a:latin typeface="Nunito Sans" pitchFamily="2" charset="0"/>
+            </a:endParaRPr>
+          </a:p>
+        </p:txBody>
+      </p:sp>
+    </p:spTree>
+    <p:extLst>
+      <p:ext uri="{BB962C8B-B14F-4D97-AF65-F5344CB8AC3E}">
+        <p14:creationId xmlns:p14="http://schemas.microsoft.com/office/powerpoint/2010/main" val="1763413131"/>
       </p:ext>
     </p:extLst>
   </p:cSld>

</xml_diff>